<commit_message>
Fixed figures a bit
</commit_message>
<xml_diff>
--- a/book/figures.pptx
+++ b/book/figures.pptx
@@ -3347,7 +3347,7 @@
         </p:nvSpPr>
         <p:spPr>
           <a:xfrm>
-            <a:off x="4063125" y="2529247"/>
+            <a:off x="4828669" y="3299713"/>
             <a:ext cx="765544" cy="811940"/>
           </a:xfrm>
           <a:prstGeom prst="ellipse">
@@ -3401,7 +3401,7 @@
         </p:nvSpPr>
         <p:spPr>
           <a:xfrm>
-            <a:off x="2648995" y="2529247"/>
+            <a:off x="2648995" y="3299713"/>
             <a:ext cx="765544" cy="811940"/>
           </a:xfrm>
           <a:prstGeom prst="ellipse">
@@ -3451,15 +3451,14 @@
             </a:extLst>
           </p:cNvPr>
           <p:cNvCxnSpPr>
-            <a:stCxn id="4" idx="2"/>
-            <a:endCxn id="5" idx="6"/>
+            <a:cxnSpLocks/>
           </p:cNvCxnSpPr>
           <p:nvPr/>
         </p:nvCxnSpPr>
         <p:spPr>
           <a:xfrm flipH="1">
-            <a:off x="3414539" y="2935217"/>
-            <a:ext cx="648586" cy="0"/>
+            <a:off x="3414539" y="3705683"/>
+            <a:ext cx="1414130" cy="0"/>
           </a:xfrm>
           <a:prstGeom prst="straightConnector1">
             <a:avLst/>
@@ -3497,7 +3496,7 @@
         </p:nvSpPr>
         <p:spPr>
           <a:xfrm>
-            <a:off x="1234870" y="2529247"/>
+            <a:off x="469321" y="3299713"/>
             <a:ext cx="765544" cy="811940"/>
           </a:xfrm>
           <a:prstGeom prst="ellipse">
@@ -3547,14 +3546,16 @@
             </a:extLst>
           </p:cNvPr>
           <p:cNvCxnSpPr>
+            <a:cxnSpLocks/>
+            <a:stCxn id="5" idx="2"/>
             <a:endCxn id="8" idx="6"/>
           </p:cNvCxnSpPr>
           <p:nvPr/>
         </p:nvCxnSpPr>
         <p:spPr>
           <a:xfrm flipH="1">
-            <a:off x="2000414" y="2935217"/>
-            <a:ext cx="648586" cy="0"/>
+            <a:off x="1234865" y="3705683"/>
+            <a:ext cx="1414130" cy="0"/>
           </a:xfrm>
           <a:prstGeom prst="straightConnector1">
             <a:avLst/>
@@ -3592,7 +3593,7 @@
         </p:nvSpPr>
         <p:spPr>
           <a:xfrm>
-            <a:off x="4063125" y="1108352"/>
+            <a:off x="4828669" y="1108352"/>
             <a:ext cx="765544" cy="811940"/>
           </a:xfrm>
           <a:prstGeom prst="ellipse">
@@ -3688,93 +3689,6 @@
       </p:sp>
       <p:cxnSp>
         <p:nvCxnSpPr>
-          <p:cNvPr id="18" name="Straight Arrow Connector 17">
-            <a:extLst>
-              <a:ext uri="{FF2B5EF4-FFF2-40B4-BE49-F238E27FC236}">
-                <a16:creationId xmlns:a16="http://schemas.microsoft.com/office/drawing/2014/main" id="{D4897571-49F0-1E49-882A-8AC4E452436B}"/>
-              </a:ext>
-            </a:extLst>
-          </p:cNvPr>
-          <p:cNvCxnSpPr>
-            <a:stCxn id="15" idx="4"/>
-            <a:endCxn id="5" idx="0"/>
-          </p:cNvCxnSpPr>
-          <p:nvPr/>
-        </p:nvCxnSpPr>
-        <p:spPr>
-          <a:xfrm>
-            <a:off x="3020123" y="1920292"/>
-            <a:ext cx="11644" cy="608955"/>
-          </a:xfrm>
-          <a:prstGeom prst="straightConnector1">
-            <a:avLst/>
-          </a:prstGeom>
-          <a:ln>
-            <a:headEnd type="triangle"/>
-            <a:tailEnd type="triangle"/>
-          </a:ln>
-        </p:spPr>
-        <p:style>
-          <a:lnRef idx="1">
-            <a:schemeClr val="accent1"/>
-          </a:lnRef>
-          <a:fillRef idx="0">
-            <a:schemeClr val="accent1"/>
-          </a:fillRef>
-          <a:effectRef idx="0">
-            <a:schemeClr val="accent1"/>
-          </a:effectRef>
-          <a:fontRef idx="minor">
-            <a:schemeClr val="tx1"/>
-          </a:fontRef>
-        </p:style>
-      </p:cxnSp>
-      <p:cxnSp>
-        <p:nvCxnSpPr>
-          <p:cNvPr id="19" name="Straight Arrow Connector 18">
-            <a:extLst>
-              <a:ext uri="{FF2B5EF4-FFF2-40B4-BE49-F238E27FC236}">
-                <a16:creationId xmlns:a16="http://schemas.microsoft.com/office/drawing/2014/main" id="{56D7FE5B-6858-FB48-9078-DD7E346C529D}"/>
-              </a:ext>
-            </a:extLst>
-          </p:cNvPr>
-          <p:cNvCxnSpPr>
-            <a:cxnSpLocks/>
-            <a:stCxn id="11" idx="4"/>
-            <a:endCxn id="4" idx="0"/>
-          </p:cNvCxnSpPr>
-          <p:nvPr/>
-        </p:nvCxnSpPr>
-        <p:spPr>
-          <a:xfrm>
-            <a:off x="4445897" y="1920292"/>
-            <a:ext cx="0" cy="608955"/>
-          </a:xfrm>
-          <a:prstGeom prst="straightConnector1">
-            <a:avLst/>
-          </a:prstGeom>
-          <a:ln>
-            <a:headEnd type="triangle"/>
-            <a:tailEnd type="triangle"/>
-          </a:ln>
-        </p:spPr>
-        <p:style>
-          <a:lnRef idx="1">
-            <a:schemeClr val="accent1"/>
-          </a:lnRef>
-          <a:fillRef idx="0">
-            <a:schemeClr val="accent1"/>
-          </a:fillRef>
-          <a:effectRef idx="0">
-            <a:schemeClr val="accent1"/>
-          </a:effectRef>
-          <a:fontRef idx="minor">
-            <a:schemeClr val="tx1"/>
-          </a:fontRef>
-        </p:style>
-      </p:cxnSp>
-      <p:cxnSp>
-        <p:nvCxnSpPr>
           <p:cNvPr id="33" name="Straight Arrow Connector 32">
             <a:extLst>
               <a:ext uri="{FF2B5EF4-FFF2-40B4-BE49-F238E27FC236}">
@@ -3792,7 +3706,7 @@
         <p:spPr>
           <a:xfrm flipH="1">
             <a:off x="3402895" y="1514322"/>
-            <a:ext cx="660230" cy="0"/>
+            <a:ext cx="1425774" cy="0"/>
           </a:xfrm>
           <a:prstGeom prst="straightConnector1">
             <a:avLst/>
@@ -3816,6 +3730,440 @@
           </a:fontRef>
         </p:style>
       </p:cxnSp>
+      <p:sp>
+        <p:nvSpPr>
+          <p:cNvPr id="3" name="TextBox 2">
+            <a:extLst>
+              <a:ext uri="{FF2B5EF4-FFF2-40B4-BE49-F238E27FC236}">
+                <a16:creationId xmlns:a16="http://schemas.microsoft.com/office/drawing/2014/main" id="{52CA47AC-E8C5-464D-8DE7-5633A9154C4A}"/>
+              </a:ext>
+            </a:extLst>
+          </p:cNvPr>
+          <p:cNvSpPr txBox="1"/>
+          <p:nvPr/>
+        </p:nvSpPr>
+        <p:spPr>
+          <a:xfrm>
+            <a:off x="3553526" y="901843"/>
+            <a:ext cx="1229825" cy="923330"/>
+          </a:xfrm>
+          <a:prstGeom prst="rect">
+            <a:avLst/>
+          </a:prstGeom>
+          <a:noFill/>
+        </p:spPr>
+        <p:txBody>
+          <a:bodyPr wrap="none" rtlCol="0">
+            <a:spAutoFit/>
+          </a:bodyPr>
+          <a:lstStyle/>
+          <a:p>
+            <a:pPr algn="ctr"/>
+            <a:r>
+              <a:rPr lang="en-US" dirty="0"/>
+              <a:t>process</a:t>
+            </a:r>
+          </a:p>
+          <a:p>
+            <a:pPr algn="ctr"/>
+            <a:r>
+              <a:rPr lang="en-US" dirty="0"/>
+              <a:t>not in </a:t>
+            </a:r>
+            <a:r>
+              <a:rPr lang="en-US" dirty="0" err="1"/>
+              <a:t>c.s</a:t>
+            </a:r>
+            <a:r>
+              <a:rPr lang="en-US" dirty="0"/>
+              <a:t>.</a:t>
+            </a:r>
+          </a:p>
+          <a:p>
+            <a:pPr algn="ctr"/>
+            <a:r>
+              <a:rPr lang="en-US" dirty="0"/>
+              <a:t>terminates</a:t>
+            </a:r>
+          </a:p>
+        </p:txBody>
+      </p:sp>
+      <p:sp>
+        <p:nvSpPr>
+          <p:cNvPr id="20" name="TextBox 19">
+            <a:extLst>
+              <a:ext uri="{FF2B5EF4-FFF2-40B4-BE49-F238E27FC236}">
+                <a16:creationId xmlns:a16="http://schemas.microsoft.com/office/drawing/2014/main" id="{867738CF-14F5-FC42-867B-365FF699A93C}"/>
+              </a:ext>
+            </a:extLst>
+          </p:cNvPr>
+          <p:cNvSpPr txBox="1"/>
+          <p:nvPr/>
+        </p:nvSpPr>
+        <p:spPr>
+          <a:xfrm>
+            <a:off x="3567505" y="3371612"/>
+            <a:ext cx="1201867" cy="646331"/>
+          </a:xfrm>
+          <a:prstGeom prst="rect">
+            <a:avLst/>
+          </a:prstGeom>
+          <a:noFill/>
+        </p:spPr>
+        <p:txBody>
+          <a:bodyPr wrap="none" rtlCol="0">
+            <a:spAutoFit/>
+          </a:bodyPr>
+          <a:lstStyle/>
+          <a:p>
+            <a:pPr algn="ctr"/>
+            <a:r>
+              <a:rPr lang="en-US" dirty="0"/>
+              <a:t>process</a:t>
+            </a:r>
+          </a:p>
+          <a:p>
+            <a:pPr algn="ctr"/>
+            <a:r>
+              <a:rPr lang="en-US" dirty="0"/>
+              <a:t>terminates</a:t>
+            </a:r>
+          </a:p>
+        </p:txBody>
+      </p:sp>
+      <p:sp>
+        <p:nvSpPr>
+          <p:cNvPr id="22" name="TextBox 21">
+            <a:extLst>
+              <a:ext uri="{FF2B5EF4-FFF2-40B4-BE49-F238E27FC236}">
+                <a16:creationId xmlns:a16="http://schemas.microsoft.com/office/drawing/2014/main" id="{4B7E1A48-AFCD-1D44-A83A-CF42FDE56357}"/>
+              </a:ext>
+            </a:extLst>
+          </p:cNvPr>
+          <p:cNvSpPr txBox="1"/>
+          <p:nvPr/>
+        </p:nvSpPr>
+        <p:spPr>
+          <a:xfrm>
+            <a:off x="1399475" y="3371612"/>
+            <a:ext cx="1201867" cy="646331"/>
+          </a:xfrm>
+          <a:prstGeom prst="rect">
+            <a:avLst/>
+          </a:prstGeom>
+          <a:noFill/>
+        </p:spPr>
+        <p:txBody>
+          <a:bodyPr wrap="none" rtlCol="0">
+            <a:spAutoFit/>
+          </a:bodyPr>
+          <a:lstStyle/>
+          <a:p>
+            <a:pPr algn="ctr"/>
+            <a:r>
+              <a:rPr lang="en-US" dirty="0"/>
+              <a:t>process</a:t>
+            </a:r>
+          </a:p>
+          <a:p>
+            <a:pPr algn="ctr"/>
+            <a:r>
+              <a:rPr lang="en-US" dirty="0"/>
+              <a:t>terminates</a:t>
+            </a:r>
+          </a:p>
+        </p:txBody>
+      </p:sp>
+      <p:sp>
+        <p:nvSpPr>
+          <p:cNvPr id="12" name="Arc 11">
+            <a:extLst>
+              <a:ext uri="{FF2B5EF4-FFF2-40B4-BE49-F238E27FC236}">
+                <a16:creationId xmlns:a16="http://schemas.microsoft.com/office/drawing/2014/main" id="{BC19845C-141F-3942-935D-EDDA7A4F0DE1}"/>
+              </a:ext>
+            </a:extLst>
+          </p:cNvPr>
+          <p:cNvSpPr/>
+          <p:nvPr/>
+        </p:nvSpPr>
+        <p:spPr>
+          <a:xfrm rot="13687481">
+            <a:off x="2416411" y="1647019"/>
+            <a:ext cx="2222950" cy="2099228"/>
+          </a:xfrm>
+          <a:prstGeom prst="arc">
+            <a:avLst/>
+          </a:prstGeom>
+          <a:ln>
+            <a:tailEnd type="triangle"/>
+          </a:ln>
+        </p:spPr>
+        <p:style>
+          <a:lnRef idx="1">
+            <a:schemeClr val="accent1"/>
+          </a:lnRef>
+          <a:fillRef idx="0">
+            <a:schemeClr val="accent1"/>
+          </a:fillRef>
+          <a:effectRef idx="0">
+            <a:schemeClr val="accent1"/>
+          </a:effectRef>
+          <a:fontRef idx="minor">
+            <a:schemeClr val="tx1"/>
+          </a:fontRef>
+        </p:style>
+        <p:txBody>
+          <a:bodyPr rtlCol="0" anchor="ctr"/>
+          <a:lstStyle/>
+          <a:p>
+            <a:pPr algn="ctr"/>
+            <a:endParaRPr lang="en-US" dirty="0"/>
+          </a:p>
+        </p:txBody>
+      </p:sp>
+      <p:sp>
+        <p:nvSpPr>
+          <p:cNvPr id="24" name="Arc 23">
+            <a:extLst>
+              <a:ext uri="{FF2B5EF4-FFF2-40B4-BE49-F238E27FC236}">
+                <a16:creationId xmlns:a16="http://schemas.microsoft.com/office/drawing/2014/main" id="{EE53FD98-5728-254F-B2B4-E90C5D3A2E6A}"/>
+              </a:ext>
+            </a:extLst>
+          </p:cNvPr>
+          <p:cNvSpPr/>
+          <p:nvPr/>
+        </p:nvSpPr>
+        <p:spPr>
+          <a:xfrm rot="13687481">
+            <a:off x="4592344" y="1647019"/>
+            <a:ext cx="2222950" cy="2099228"/>
+          </a:xfrm>
+          <a:prstGeom prst="arc">
+            <a:avLst/>
+          </a:prstGeom>
+          <a:ln>
+            <a:tailEnd type="triangle"/>
+          </a:ln>
+        </p:spPr>
+        <p:style>
+          <a:lnRef idx="1">
+            <a:schemeClr val="accent1"/>
+          </a:lnRef>
+          <a:fillRef idx="0">
+            <a:schemeClr val="accent1"/>
+          </a:fillRef>
+          <a:effectRef idx="0">
+            <a:schemeClr val="accent1"/>
+          </a:effectRef>
+          <a:fontRef idx="minor">
+            <a:schemeClr val="tx1"/>
+          </a:fontRef>
+        </p:style>
+        <p:txBody>
+          <a:bodyPr rtlCol="0" anchor="ctr"/>
+          <a:lstStyle/>
+          <a:p>
+            <a:pPr algn="ctr"/>
+            <a:endParaRPr lang="en-US" dirty="0"/>
+          </a:p>
+        </p:txBody>
+      </p:sp>
+      <p:sp>
+        <p:nvSpPr>
+          <p:cNvPr id="25" name="TextBox 24">
+            <a:extLst>
+              <a:ext uri="{FF2B5EF4-FFF2-40B4-BE49-F238E27FC236}">
+                <a16:creationId xmlns:a16="http://schemas.microsoft.com/office/drawing/2014/main" id="{231E2855-06B4-5C46-A67A-F9130B42F97C}"/>
+              </a:ext>
+            </a:extLst>
+          </p:cNvPr>
+          <p:cNvSpPr txBox="1"/>
+          <p:nvPr/>
+        </p:nvSpPr>
+        <p:spPr>
+          <a:xfrm>
+            <a:off x="1359043" y="2180326"/>
+            <a:ext cx="1131464" cy="646331"/>
+          </a:xfrm>
+          <a:prstGeom prst="rect">
+            <a:avLst/>
+          </a:prstGeom>
+          <a:noFill/>
+        </p:spPr>
+        <p:txBody>
+          <a:bodyPr wrap="none" rtlCol="0">
+            <a:spAutoFit/>
+          </a:bodyPr>
+          <a:lstStyle/>
+          <a:p>
+            <a:pPr algn="ctr"/>
+            <a:r>
+              <a:rPr lang="en-US" dirty="0"/>
+              <a:t>process</a:t>
+            </a:r>
+          </a:p>
+          <a:p>
+            <a:pPr algn="ctr"/>
+            <a:r>
+              <a:rPr lang="en-US" dirty="0"/>
+              <a:t>enters </a:t>
+            </a:r>
+            <a:r>
+              <a:rPr lang="en-US" dirty="0" err="1"/>
+              <a:t>c.s</a:t>
+            </a:r>
+            <a:r>
+              <a:rPr lang="en-US" dirty="0"/>
+              <a:t>.</a:t>
+            </a:r>
+          </a:p>
+        </p:txBody>
+      </p:sp>
+      <p:sp>
+        <p:nvSpPr>
+          <p:cNvPr id="31" name="Arc 30">
+            <a:extLst>
+              <a:ext uri="{FF2B5EF4-FFF2-40B4-BE49-F238E27FC236}">
+                <a16:creationId xmlns:a16="http://schemas.microsoft.com/office/drawing/2014/main" id="{149690CC-F6B4-774C-9BB0-CD7094E17577}"/>
+              </a:ext>
+            </a:extLst>
+          </p:cNvPr>
+          <p:cNvSpPr/>
+          <p:nvPr/>
+        </p:nvSpPr>
+        <p:spPr>
+          <a:xfrm rot="2700000">
+            <a:off x="3599942" y="1560390"/>
+            <a:ext cx="2222950" cy="2099228"/>
+          </a:xfrm>
+          <a:prstGeom prst="arc">
+            <a:avLst/>
+          </a:prstGeom>
+          <a:ln>
+            <a:tailEnd type="triangle"/>
+          </a:ln>
+        </p:spPr>
+        <p:style>
+          <a:lnRef idx="1">
+            <a:schemeClr val="accent1"/>
+          </a:lnRef>
+          <a:fillRef idx="0">
+            <a:schemeClr val="accent1"/>
+          </a:fillRef>
+          <a:effectRef idx="0">
+            <a:schemeClr val="accent1"/>
+          </a:effectRef>
+          <a:fontRef idx="minor">
+            <a:schemeClr val="tx1"/>
+          </a:fontRef>
+        </p:style>
+        <p:txBody>
+          <a:bodyPr rtlCol="0" anchor="ctr"/>
+          <a:lstStyle/>
+          <a:p>
+            <a:pPr algn="ctr"/>
+            <a:endParaRPr lang="en-US" dirty="0"/>
+          </a:p>
+        </p:txBody>
+      </p:sp>
+      <p:sp>
+        <p:nvSpPr>
+          <p:cNvPr id="32" name="Arc 31">
+            <a:extLst>
+              <a:ext uri="{FF2B5EF4-FFF2-40B4-BE49-F238E27FC236}">
+                <a16:creationId xmlns:a16="http://schemas.microsoft.com/office/drawing/2014/main" id="{28AE7A61-2A24-4145-B5BC-0CA4BE622E0A}"/>
+              </a:ext>
+            </a:extLst>
+          </p:cNvPr>
+          <p:cNvSpPr/>
+          <p:nvPr/>
+        </p:nvSpPr>
+        <p:spPr>
+          <a:xfrm rot="2700000">
+            <a:off x="1398608" y="1560389"/>
+            <a:ext cx="2222950" cy="2099228"/>
+          </a:xfrm>
+          <a:prstGeom prst="arc">
+            <a:avLst/>
+          </a:prstGeom>
+          <a:ln>
+            <a:tailEnd type="triangle"/>
+          </a:ln>
+        </p:spPr>
+        <p:style>
+          <a:lnRef idx="1">
+            <a:schemeClr val="accent1"/>
+          </a:lnRef>
+          <a:fillRef idx="0">
+            <a:schemeClr val="accent1"/>
+          </a:fillRef>
+          <a:effectRef idx="0">
+            <a:schemeClr val="accent1"/>
+          </a:effectRef>
+          <a:fontRef idx="minor">
+            <a:schemeClr val="tx1"/>
+          </a:fontRef>
+        </p:style>
+        <p:txBody>
+          <a:bodyPr rtlCol="0" anchor="ctr"/>
+          <a:lstStyle/>
+          <a:p>
+            <a:pPr algn="ctr"/>
+            <a:endParaRPr lang="en-US" dirty="0"/>
+          </a:p>
+        </p:txBody>
+      </p:sp>
+      <p:sp>
+        <p:nvSpPr>
+          <p:cNvPr id="34" name="TextBox 33">
+            <a:extLst>
+              <a:ext uri="{FF2B5EF4-FFF2-40B4-BE49-F238E27FC236}">
+                <a16:creationId xmlns:a16="http://schemas.microsoft.com/office/drawing/2014/main" id="{BEF43491-7E73-F242-9DE8-B1D708A8BBC0}"/>
+              </a:ext>
+            </a:extLst>
+          </p:cNvPr>
+          <p:cNvSpPr txBox="1"/>
+          <p:nvPr/>
+        </p:nvSpPr>
+        <p:spPr>
+          <a:xfrm>
+            <a:off x="5766061" y="2180326"/>
+            <a:ext cx="1122743" cy="646331"/>
+          </a:xfrm>
+          <a:prstGeom prst="rect">
+            <a:avLst/>
+          </a:prstGeom>
+          <a:noFill/>
+        </p:spPr>
+        <p:txBody>
+          <a:bodyPr wrap="none" rtlCol="0">
+            <a:spAutoFit/>
+          </a:bodyPr>
+          <a:lstStyle/>
+          <a:p>
+            <a:pPr algn="ctr"/>
+            <a:r>
+              <a:rPr lang="en-US" dirty="0"/>
+              <a:t>process</a:t>
+            </a:r>
+          </a:p>
+          <a:p>
+            <a:pPr algn="ctr"/>
+            <a:r>
+              <a:rPr lang="en-US" dirty="0"/>
+              <a:t>leaves </a:t>
+            </a:r>
+            <a:r>
+              <a:rPr lang="en-US" dirty="0" err="1"/>
+              <a:t>c.s</a:t>
+            </a:r>
+            <a:r>
+              <a:rPr lang="en-US" dirty="0"/>
+              <a:t>.</a:t>
+            </a:r>
+          </a:p>
+        </p:txBody>
+      </p:sp>
     </p:spTree>
     <p:extLst>
       <p:ext uri="{BB962C8B-B14F-4D97-AF65-F5344CB8AC3E}">
@@ -4203,93 +4551,6 @@
       </p:sp>
       <p:cxnSp>
         <p:nvCxnSpPr>
-          <p:cNvPr id="18" name="Straight Arrow Connector 17">
-            <a:extLst>
-              <a:ext uri="{FF2B5EF4-FFF2-40B4-BE49-F238E27FC236}">
-                <a16:creationId xmlns:a16="http://schemas.microsoft.com/office/drawing/2014/main" id="{D4897571-49F0-1E49-882A-8AC4E452436B}"/>
-              </a:ext>
-            </a:extLst>
-          </p:cNvPr>
-          <p:cNvCxnSpPr>
-            <a:stCxn id="15" idx="4"/>
-            <a:endCxn id="5" idx="0"/>
-          </p:cNvCxnSpPr>
-          <p:nvPr/>
-        </p:nvCxnSpPr>
-        <p:spPr>
-          <a:xfrm>
-            <a:off x="3779270" y="2870366"/>
-            <a:ext cx="11644" cy="600462"/>
-          </a:xfrm>
-          <a:prstGeom prst="straightConnector1">
-            <a:avLst/>
-          </a:prstGeom>
-          <a:ln>
-            <a:headEnd type="triangle"/>
-            <a:tailEnd type="triangle"/>
-          </a:ln>
-        </p:spPr>
-        <p:style>
-          <a:lnRef idx="1">
-            <a:schemeClr val="accent1"/>
-          </a:lnRef>
-          <a:fillRef idx="0">
-            <a:schemeClr val="accent1"/>
-          </a:fillRef>
-          <a:effectRef idx="0">
-            <a:schemeClr val="accent1"/>
-          </a:effectRef>
-          <a:fontRef idx="minor">
-            <a:schemeClr val="tx1"/>
-          </a:fontRef>
-        </p:style>
-      </p:cxnSp>
-      <p:cxnSp>
-        <p:nvCxnSpPr>
-          <p:cNvPr id="19" name="Straight Arrow Connector 18">
-            <a:extLst>
-              <a:ext uri="{FF2B5EF4-FFF2-40B4-BE49-F238E27FC236}">
-                <a16:creationId xmlns:a16="http://schemas.microsoft.com/office/drawing/2014/main" id="{56D7FE5B-6858-FB48-9078-DD7E346C529D}"/>
-              </a:ext>
-            </a:extLst>
-          </p:cNvPr>
-          <p:cNvCxnSpPr>
-            <a:cxnSpLocks/>
-            <a:stCxn id="11" idx="4"/>
-            <a:endCxn id="4" idx="0"/>
-          </p:cNvCxnSpPr>
-          <p:nvPr/>
-        </p:nvCxnSpPr>
-        <p:spPr>
-          <a:xfrm>
-            <a:off x="5205044" y="2870366"/>
-            <a:ext cx="0" cy="600462"/>
-          </a:xfrm>
-          <a:prstGeom prst="straightConnector1">
-            <a:avLst/>
-          </a:prstGeom>
-          <a:ln>
-            <a:headEnd type="triangle"/>
-            <a:tailEnd type="triangle"/>
-          </a:ln>
-        </p:spPr>
-        <p:style>
-          <a:lnRef idx="1">
-            <a:schemeClr val="accent1"/>
-          </a:lnRef>
-          <a:fillRef idx="0">
-            <a:schemeClr val="accent1"/>
-          </a:fillRef>
-          <a:effectRef idx="0">
-            <a:schemeClr val="accent1"/>
-          </a:effectRef>
-          <a:fontRef idx="minor">
-            <a:schemeClr val="tx1"/>
-          </a:fontRef>
-        </p:style>
-      </p:cxnSp>
-      <p:cxnSp>
-        <p:nvCxnSpPr>
           <p:cNvPr id="33" name="Straight Arrow Connector 32">
             <a:extLst>
               <a:ext uri="{FF2B5EF4-FFF2-40B4-BE49-F238E27FC236}">
@@ -4536,130 +4797,1185 @@
           </a:fontRef>
         </p:style>
       </p:cxnSp>
-      <p:cxnSp>
-        <p:nvCxnSpPr>
-          <p:cNvPr id="47" name="Straight Arrow Connector 46">
-            <a:extLst>
-              <a:ext uri="{FF2B5EF4-FFF2-40B4-BE49-F238E27FC236}">
-                <a16:creationId xmlns:a16="http://schemas.microsoft.com/office/drawing/2014/main" id="{3668A905-65E4-8D44-BE1E-ABDD4AC4A18A}"/>
-              </a:ext>
-            </a:extLst>
-          </p:cNvPr>
-          <p:cNvCxnSpPr>
-            <a:cxnSpLocks/>
-          </p:cNvCxnSpPr>
+      <p:grpSp>
+        <p:nvGrpSpPr>
+          <p:cNvPr id="62" name="Group 61">
+            <a:extLst>
+              <a:ext uri="{FF2B5EF4-FFF2-40B4-BE49-F238E27FC236}">
+                <a16:creationId xmlns:a16="http://schemas.microsoft.com/office/drawing/2014/main" id="{A36EC626-8FC3-DC47-87DD-800DA38EF9A3}"/>
+              </a:ext>
+            </a:extLst>
+          </p:cNvPr>
+          <p:cNvGrpSpPr/>
           <p:nvPr/>
-        </p:nvCxnSpPr>
-        <p:spPr>
+        </p:nvGrpSpPr>
+        <p:grpSpPr>
           <a:xfrm>
-            <a:off x="5205044" y="1796477"/>
-            <a:ext cx="0" cy="600462"/>
-          </a:xfrm>
-          <a:prstGeom prst="straightConnector1">
+            <a:off x="4628460" y="1664016"/>
+            <a:ext cx="1153165" cy="861463"/>
+            <a:chOff x="6515069" y="931263"/>
+            <a:chExt cx="3091630" cy="2309579"/>
+          </a:xfrm>
+        </p:grpSpPr>
+        <p:sp>
+          <p:nvSpPr>
+            <p:cNvPr id="60" name="Arc 59">
+              <a:extLst>
+                <a:ext uri="{FF2B5EF4-FFF2-40B4-BE49-F238E27FC236}">
+                  <a16:creationId xmlns:a16="http://schemas.microsoft.com/office/drawing/2014/main" id="{9BA7551B-EE2A-E040-8B34-6073BF84BC95}"/>
+                </a:ext>
+              </a:extLst>
+            </p:cNvPr>
+            <p:cNvSpPr/>
+            <p:nvPr/>
+          </p:nvSpPr>
+          <p:spPr>
+            <a:xfrm rot="13687481">
+              <a:off x="7445610" y="1079753"/>
+              <a:ext cx="2222950" cy="2099228"/>
+            </a:xfrm>
+            <a:prstGeom prst="arc">
+              <a:avLst/>
+            </a:prstGeom>
+            <a:ln>
+              <a:tailEnd type="triangle"/>
+            </a:ln>
+          </p:spPr>
+          <p:style>
+            <a:lnRef idx="1">
+              <a:schemeClr val="accent1"/>
+            </a:lnRef>
+            <a:fillRef idx="0">
+              <a:schemeClr val="accent1"/>
+            </a:fillRef>
+            <a:effectRef idx="0">
+              <a:schemeClr val="accent1"/>
+            </a:effectRef>
+            <a:fontRef idx="minor">
+              <a:schemeClr val="tx1"/>
+            </a:fontRef>
+          </p:style>
+          <p:txBody>
+            <a:bodyPr rtlCol="0" anchor="ctr"/>
+            <a:lstStyle/>
+            <a:p>
+              <a:pPr algn="ctr"/>
+              <a:endParaRPr lang="en-US" dirty="0"/>
+            </a:p>
+          </p:txBody>
+        </p:sp>
+        <p:sp>
+          <p:nvSpPr>
+            <p:cNvPr id="61" name="Arc 60">
+              <a:extLst>
+                <a:ext uri="{FF2B5EF4-FFF2-40B4-BE49-F238E27FC236}">
+                  <a16:creationId xmlns:a16="http://schemas.microsoft.com/office/drawing/2014/main" id="{C3D2E0F8-6B3A-F341-A8CF-11CFC9BED492}"/>
+                </a:ext>
+              </a:extLst>
+            </p:cNvPr>
+            <p:cNvSpPr/>
+            <p:nvPr/>
+          </p:nvSpPr>
+          <p:spPr>
+            <a:xfrm rot="2700000">
+              <a:off x="6453208" y="993124"/>
+              <a:ext cx="2222950" cy="2099228"/>
+            </a:xfrm>
+            <a:prstGeom prst="arc">
+              <a:avLst/>
+            </a:prstGeom>
+            <a:ln>
+              <a:tailEnd type="triangle"/>
+            </a:ln>
+          </p:spPr>
+          <p:style>
+            <a:lnRef idx="1">
+              <a:schemeClr val="accent1"/>
+            </a:lnRef>
+            <a:fillRef idx="0">
+              <a:schemeClr val="accent1"/>
+            </a:fillRef>
+            <a:effectRef idx="0">
+              <a:schemeClr val="accent1"/>
+            </a:effectRef>
+            <a:fontRef idx="minor">
+              <a:schemeClr val="tx1"/>
+            </a:fontRef>
+          </p:style>
+          <p:txBody>
+            <a:bodyPr rtlCol="0" anchor="ctr"/>
+            <a:lstStyle/>
+            <a:p>
+              <a:pPr algn="ctr"/>
+              <a:endParaRPr lang="en-US" dirty="0"/>
+            </a:p>
+          </p:txBody>
+        </p:sp>
+      </p:grpSp>
+      <p:grpSp>
+        <p:nvGrpSpPr>
+          <p:cNvPr id="63" name="Group 62">
+            <a:extLst>
+              <a:ext uri="{FF2B5EF4-FFF2-40B4-BE49-F238E27FC236}">
+                <a16:creationId xmlns:a16="http://schemas.microsoft.com/office/drawing/2014/main" id="{A7C7B314-2147-7545-955E-EB7DF46A6534}"/>
+              </a:ext>
+            </a:extLst>
+          </p:cNvPr>
+          <p:cNvGrpSpPr/>
+          <p:nvPr/>
+        </p:nvGrpSpPr>
+        <p:grpSpPr>
+          <a:xfrm>
+            <a:off x="3206060" y="2747749"/>
+            <a:ext cx="1153165" cy="861463"/>
+            <a:chOff x="6515069" y="931263"/>
+            <a:chExt cx="3091630" cy="2309579"/>
+          </a:xfrm>
+        </p:grpSpPr>
+        <p:sp>
+          <p:nvSpPr>
+            <p:cNvPr id="64" name="Arc 63">
+              <a:extLst>
+                <a:ext uri="{FF2B5EF4-FFF2-40B4-BE49-F238E27FC236}">
+                  <a16:creationId xmlns:a16="http://schemas.microsoft.com/office/drawing/2014/main" id="{9C08FC5F-C490-7945-A086-49087D213361}"/>
+                </a:ext>
+              </a:extLst>
+            </p:cNvPr>
+            <p:cNvSpPr/>
+            <p:nvPr/>
+          </p:nvSpPr>
+          <p:spPr>
+            <a:xfrm rot="13687481">
+              <a:off x="7445610" y="1079753"/>
+              <a:ext cx="2222950" cy="2099228"/>
+            </a:xfrm>
+            <a:prstGeom prst="arc">
+              <a:avLst/>
+            </a:prstGeom>
+            <a:ln>
+              <a:tailEnd type="triangle"/>
+            </a:ln>
+          </p:spPr>
+          <p:style>
+            <a:lnRef idx="1">
+              <a:schemeClr val="accent1"/>
+            </a:lnRef>
+            <a:fillRef idx="0">
+              <a:schemeClr val="accent1"/>
+            </a:fillRef>
+            <a:effectRef idx="0">
+              <a:schemeClr val="accent1"/>
+            </a:effectRef>
+            <a:fontRef idx="minor">
+              <a:schemeClr val="tx1"/>
+            </a:fontRef>
+          </p:style>
+          <p:txBody>
+            <a:bodyPr rtlCol="0" anchor="ctr"/>
+            <a:lstStyle/>
+            <a:p>
+              <a:pPr algn="ctr"/>
+              <a:endParaRPr lang="en-US" dirty="0"/>
+            </a:p>
+          </p:txBody>
+        </p:sp>
+        <p:sp>
+          <p:nvSpPr>
+            <p:cNvPr id="65" name="Arc 64">
+              <a:extLst>
+                <a:ext uri="{FF2B5EF4-FFF2-40B4-BE49-F238E27FC236}">
+                  <a16:creationId xmlns:a16="http://schemas.microsoft.com/office/drawing/2014/main" id="{EBC27A93-8689-8140-AF14-D46DE0E8194D}"/>
+                </a:ext>
+              </a:extLst>
+            </p:cNvPr>
+            <p:cNvSpPr/>
+            <p:nvPr/>
+          </p:nvSpPr>
+          <p:spPr>
+            <a:xfrm rot="2700000">
+              <a:off x="6453208" y="993124"/>
+              <a:ext cx="2222950" cy="2099228"/>
+            </a:xfrm>
+            <a:prstGeom prst="arc">
+              <a:avLst/>
+            </a:prstGeom>
+            <a:ln>
+              <a:tailEnd type="triangle"/>
+            </a:ln>
+          </p:spPr>
+          <p:style>
+            <a:lnRef idx="1">
+              <a:schemeClr val="accent1"/>
+            </a:lnRef>
+            <a:fillRef idx="0">
+              <a:schemeClr val="accent1"/>
+            </a:fillRef>
+            <a:effectRef idx="0">
+              <a:schemeClr val="accent1"/>
+            </a:effectRef>
+            <a:fontRef idx="minor">
+              <a:schemeClr val="tx1"/>
+            </a:fontRef>
+          </p:style>
+          <p:txBody>
+            <a:bodyPr rtlCol="0" anchor="ctr"/>
+            <a:lstStyle/>
+            <a:p>
+              <a:pPr algn="ctr"/>
+              <a:endParaRPr lang="en-US" dirty="0"/>
+            </a:p>
+          </p:txBody>
+        </p:sp>
+      </p:grpSp>
+      <p:grpSp>
+        <p:nvGrpSpPr>
+          <p:cNvPr id="66" name="Group 65">
+            <a:extLst>
+              <a:ext uri="{FF2B5EF4-FFF2-40B4-BE49-F238E27FC236}">
+                <a16:creationId xmlns:a16="http://schemas.microsoft.com/office/drawing/2014/main" id="{F60D0057-8A04-2549-BFFA-148B6EEE92BA}"/>
+              </a:ext>
+            </a:extLst>
+          </p:cNvPr>
+          <p:cNvGrpSpPr/>
+          <p:nvPr/>
+        </p:nvGrpSpPr>
+        <p:grpSpPr>
+          <a:xfrm>
+            <a:off x="4636926" y="2747749"/>
+            <a:ext cx="1153165" cy="861463"/>
+            <a:chOff x="6515069" y="931263"/>
+            <a:chExt cx="3091630" cy="2309579"/>
+          </a:xfrm>
+        </p:grpSpPr>
+        <p:sp>
+          <p:nvSpPr>
+            <p:cNvPr id="67" name="Arc 66">
+              <a:extLst>
+                <a:ext uri="{FF2B5EF4-FFF2-40B4-BE49-F238E27FC236}">
+                  <a16:creationId xmlns:a16="http://schemas.microsoft.com/office/drawing/2014/main" id="{BFF5F388-A54F-4F4A-867A-75B093CE2B15}"/>
+                </a:ext>
+              </a:extLst>
+            </p:cNvPr>
+            <p:cNvSpPr/>
+            <p:nvPr/>
+          </p:nvSpPr>
+          <p:spPr>
+            <a:xfrm rot="13687481">
+              <a:off x="7445610" y="1079753"/>
+              <a:ext cx="2222950" cy="2099228"/>
+            </a:xfrm>
+            <a:prstGeom prst="arc">
+              <a:avLst/>
+            </a:prstGeom>
+            <a:ln>
+              <a:tailEnd type="triangle"/>
+            </a:ln>
+          </p:spPr>
+          <p:style>
+            <a:lnRef idx="1">
+              <a:schemeClr val="accent1"/>
+            </a:lnRef>
+            <a:fillRef idx="0">
+              <a:schemeClr val="accent1"/>
+            </a:fillRef>
+            <a:effectRef idx="0">
+              <a:schemeClr val="accent1"/>
+            </a:effectRef>
+            <a:fontRef idx="minor">
+              <a:schemeClr val="tx1"/>
+            </a:fontRef>
+          </p:style>
+          <p:txBody>
+            <a:bodyPr rtlCol="0" anchor="ctr"/>
+            <a:lstStyle/>
+            <a:p>
+              <a:pPr algn="ctr"/>
+              <a:endParaRPr lang="en-US" dirty="0"/>
+            </a:p>
+          </p:txBody>
+        </p:sp>
+        <p:sp>
+          <p:nvSpPr>
+            <p:cNvPr id="68" name="Arc 67">
+              <a:extLst>
+                <a:ext uri="{FF2B5EF4-FFF2-40B4-BE49-F238E27FC236}">
+                  <a16:creationId xmlns:a16="http://schemas.microsoft.com/office/drawing/2014/main" id="{7BD1683D-4746-7F44-8C07-38649F30D44F}"/>
+                </a:ext>
+              </a:extLst>
+            </p:cNvPr>
+            <p:cNvSpPr/>
+            <p:nvPr/>
+          </p:nvSpPr>
+          <p:spPr>
+            <a:xfrm rot="2700000">
+              <a:off x="6453208" y="993124"/>
+              <a:ext cx="2222950" cy="2099228"/>
+            </a:xfrm>
+            <a:prstGeom prst="arc">
+              <a:avLst/>
+            </a:prstGeom>
+            <a:ln>
+              <a:tailEnd type="triangle"/>
+            </a:ln>
+          </p:spPr>
+          <p:style>
+            <a:lnRef idx="1">
+              <a:schemeClr val="accent1"/>
+            </a:lnRef>
+            <a:fillRef idx="0">
+              <a:schemeClr val="accent1"/>
+            </a:fillRef>
+            <a:effectRef idx="0">
+              <a:schemeClr val="accent1"/>
+            </a:effectRef>
+            <a:fontRef idx="minor">
+              <a:schemeClr val="tx1"/>
+            </a:fontRef>
+          </p:style>
+          <p:txBody>
+            <a:bodyPr rtlCol="0" anchor="ctr"/>
+            <a:lstStyle/>
+            <a:p>
+              <a:pPr algn="ctr"/>
+              <a:endParaRPr lang="en-US" dirty="0"/>
+            </a:p>
+          </p:txBody>
+        </p:sp>
+      </p:grpSp>
+      <p:sp>
+        <p:nvSpPr>
+          <p:cNvPr id="75" name="TextBox 74">
+            <a:extLst>
+              <a:ext uri="{FF2B5EF4-FFF2-40B4-BE49-F238E27FC236}">
+                <a16:creationId xmlns:a16="http://schemas.microsoft.com/office/drawing/2014/main" id="{043144EB-A049-9F4D-998A-2A55AF8DE73D}"/>
+              </a:ext>
+            </a:extLst>
+          </p:cNvPr>
+          <p:cNvSpPr txBox="1"/>
+          <p:nvPr/>
+        </p:nvSpPr>
+        <p:spPr>
+          <a:xfrm>
+            <a:off x="1998488" y="737591"/>
+            <a:ext cx="2835841" cy="1477328"/>
+          </a:xfrm>
+          <a:prstGeom prst="rect">
             <a:avLst/>
           </a:prstGeom>
-          <a:ln>
-            <a:headEnd type="triangle"/>
-            <a:tailEnd type="triangle"/>
-          </a:ln>
-        </p:spPr>
-        <p:style>
-          <a:lnRef idx="1">
-            <a:schemeClr val="accent1"/>
-          </a:lnRef>
-          <a:fillRef idx="0">
-            <a:schemeClr val="accent1"/>
-          </a:fillRef>
-          <a:effectRef idx="0">
-            <a:schemeClr val="accent1"/>
-          </a:effectRef>
-          <a:fontRef idx="minor">
-            <a:schemeClr val="tx1"/>
-          </a:fontRef>
-        </p:style>
-      </p:cxnSp>
-      <p:cxnSp>
-        <p:nvCxnSpPr>
-          <p:cNvPr id="48" name="Straight Arrow Connector 47">
-            <a:extLst>
-              <a:ext uri="{FF2B5EF4-FFF2-40B4-BE49-F238E27FC236}">
-                <a16:creationId xmlns:a16="http://schemas.microsoft.com/office/drawing/2014/main" id="{83A680C6-F350-764B-8ACF-21899991368A}"/>
-              </a:ext>
-            </a:extLst>
-          </p:cNvPr>
-          <p:cNvCxnSpPr/>
+          <a:noFill/>
+        </p:spPr>
+        <p:txBody>
+          <a:bodyPr wrap="none" rtlCol="0">
+            <a:spAutoFit/>
+          </a:bodyPr>
+          <a:lstStyle/>
+          <a:p>
+            <a:pPr marL="342900" indent="-342900">
+              <a:buAutoNum type="arabicParenBoth"/>
+            </a:pPr>
+            <a:r>
+              <a:rPr lang="en-US" dirty="0"/>
+              <a:t>process not in </a:t>
+            </a:r>
+            <a:r>
+              <a:rPr lang="en-US" dirty="0" err="1"/>
+              <a:t>c.s</a:t>
+            </a:r>
+            <a:r>
+              <a:rPr lang="en-US" dirty="0"/>
+              <a:t>. leaves</a:t>
+            </a:r>
+          </a:p>
+          <a:p>
+            <a:pPr marL="342900" indent="-342900">
+              <a:buAutoNum type="arabicParenBoth"/>
+            </a:pPr>
+            <a:r>
+              <a:rPr lang="en-US" dirty="0"/>
+              <a:t>process enters </a:t>
+            </a:r>
+            <a:r>
+              <a:rPr lang="en-US" dirty="0" err="1"/>
+              <a:t>r.c.s</a:t>
+            </a:r>
+            <a:r>
+              <a:rPr lang="en-US" dirty="0"/>
+              <a:t>.</a:t>
+            </a:r>
+          </a:p>
+          <a:p>
+            <a:pPr marL="342900" indent="-342900">
+              <a:buAutoNum type="arabicParenBoth"/>
+            </a:pPr>
+            <a:r>
+              <a:rPr lang="en-US" dirty="0"/>
+              <a:t>process leaves </a:t>
+            </a:r>
+            <a:r>
+              <a:rPr lang="en-US" dirty="0" err="1"/>
+              <a:t>r.c.s</a:t>
+            </a:r>
+            <a:r>
+              <a:rPr lang="en-US" dirty="0"/>
+              <a:t>.</a:t>
+            </a:r>
+          </a:p>
+          <a:p>
+            <a:pPr marL="342900" indent="-342900">
+              <a:buAutoNum type="arabicParenBoth"/>
+            </a:pPr>
+            <a:r>
+              <a:rPr lang="en-US" dirty="0"/>
+              <a:t>process enters </a:t>
+            </a:r>
+            <a:r>
+              <a:rPr lang="en-US" dirty="0" err="1"/>
+              <a:t>w.c.s</a:t>
+            </a:r>
+            <a:r>
+              <a:rPr lang="en-US" dirty="0"/>
+              <a:t>.</a:t>
+            </a:r>
+          </a:p>
+          <a:p>
+            <a:pPr marL="342900" indent="-342900">
+              <a:buAutoNum type="arabicParenBoth"/>
+            </a:pPr>
+            <a:r>
+              <a:rPr lang="en-US" dirty="0"/>
+              <a:t>process leaves </a:t>
+            </a:r>
+            <a:r>
+              <a:rPr lang="en-US" dirty="0" err="1"/>
+              <a:t>w.c.s</a:t>
+            </a:r>
+            <a:r>
+              <a:rPr lang="en-US" dirty="0"/>
+              <a:t>.</a:t>
+            </a:r>
+          </a:p>
+        </p:txBody>
+      </p:sp>
+      <p:sp>
+        <p:nvSpPr>
+          <p:cNvPr id="76" name="TextBox 75">
+            <a:extLst>
+              <a:ext uri="{FF2B5EF4-FFF2-40B4-BE49-F238E27FC236}">
+                <a16:creationId xmlns:a16="http://schemas.microsoft.com/office/drawing/2014/main" id="{71492A1D-9B52-6F4B-AC6E-39B55521BD7D}"/>
+              </a:ext>
+            </a:extLst>
+          </p:cNvPr>
+          <p:cNvSpPr txBox="1"/>
           <p:nvPr/>
-        </p:nvCxnSpPr>
+        </p:nvSpPr>
         <p:spPr>
           <a:xfrm>
-            <a:off x="3779270" y="3954887"/>
-            <a:ext cx="11644" cy="600462"/>
-          </a:xfrm>
-          <a:prstGeom prst="straightConnector1">
+            <a:off x="2887883" y="3379153"/>
+            <a:ext cx="442750" cy="369332"/>
+          </a:xfrm>
+          <a:prstGeom prst="rect">
             <a:avLst/>
           </a:prstGeom>
-          <a:ln>
-            <a:headEnd type="triangle"/>
-            <a:tailEnd type="triangle"/>
-          </a:ln>
-        </p:spPr>
-        <p:style>
-          <a:lnRef idx="1">
-            <a:schemeClr val="accent1"/>
-          </a:lnRef>
-          <a:fillRef idx="0">
-            <a:schemeClr val="accent1"/>
-          </a:fillRef>
-          <a:effectRef idx="0">
-            <a:schemeClr val="accent1"/>
-          </a:effectRef>
-          <a:fontRef idx="minor">
-            <a:schemeClr val="tx1"/>
-          </a:fontRef>
-        </p:style>
-      </p:cxnSp>
-      <p:cxnSp>
-        <p:nvCxnSpPr>
-          <p:cNvPr id="49" name="Straight Arrow Connector 48">
-            <a:extLst>
-              <a:ext uri="{FF2B5EF4-FFF2-40B4-BE49-F238E27FC236}">
-                <a16:creationId xmlns:a16="http://schemas.microsoft.com/office/drawing/2014/main" id="{A5EF10F0-E9EB-0148-8703-ADE413EC6171}"/>
-              </a:ext>
-            </a:extLst>
-          </p:cNvPr>
-          <p:cNvCxnSpPr>
-            <a:cxnSpLocks/>
-          </p:cNvCxnSpPr>
+          <a:noFill/>
+        </p:spPr>
+        <p:txBody>
+          <a:bodyPr wrap="none" rtlCol="0">
+            <a:spAutoFit/>
+          </a:bodyPr>
+          <a:lstStyle/>
+          <a:p>
+            <a:r>
+              <a:rPr lang="en-US" dirty="0"/>
+              <a:t>(1)</a:t>
+            </a:r>
+          </a:p>
+        </p:txBody>
+      </p:sp>
+      <p:sp>
+        <p:nvSpPr>
+          <p:cNvPr id="77" name="TextBox 76">
+            <a:extLst>
+              <a:ext uri="{FF2B5EF4-FFF2-40B4-BE49-F238E27FC236}">
+                <a16:creationId xmlns:a16="http://schemas.microsoft.com/office/drawing/2014/main" id="{B8ACDC64-A1DF-CB4A-873C-31A8793BB42E}"/>
+              </a:ext>
+            </a:extLst>
+          </p:cNvPr>
+          <p:cNvSpPr txBox="1"/>
           <p:nvPr/>
-        </p:nvCxnSpPr>
+        </p:nvSpPr>
         <p:spPr>
           <a:xfrm>
-            <a:off x="5205044" y="3954887"/>
-            <a:ext cx="0" cy="600462"/>
-          </a:xfrm>
-          <a:prstGeom prst="straightConnector1">
+            <a:off x="4293350" y="3379153"/>
+            <a:ext cx="442750" cy="369332"/>
+          </a:xfrm>
+          <a:prstGeom prst="rect">
             <a:avLst/>
           </a:prstGeom>
-          <a:ln>
-            <a:headEnd type="triangle"/>
-            <a:tailEnd type="triangle"/>
-          </a:ln>
-        </p:spPr>
-        <p:style>
-          <a:lnRef idx="1">
-            <a:schemeClr val="accent1"/>
-          </a:lnRef>
-          <a:fillRef idx="0">
-            <a:schemeClr val="accent1"/>
-          </a:fillRef>
-          <a:effectRef idx="0">
-            <a:schemeClr val="accent1"/>
-          </a:effectRef>
-          <a:fontRef idx="minor">
-            <a:schemeClr val="tx1"/>
-          </a:fontRef>
-        </p:style>
-      </p:cxnSp>
+          <a:noFill/>
+        </p:spPr>
+        <p:txBody>
+          <a:bodyPr wrap="none" rtlCol="0">
+            <a:spAutoFit/>
+          </a:bodyPr>
+          <a:lstStyle/>
+          <a:p>
+            <a:r>
+              <a:rPr lang="en-US" dirty="0"/>
+              <a:t>(1)</a:t>
+            </a:r>
+          </a:p>
+        </p:txBody>
+      </p:sp>
+      <p:sp>
+        <p:nvSpPr>
+          <p:cNvPr id="78" name="TextBox 77">
+            <a:extLst>
+              <a:ext uri="{FF2B5EF4-FFF2-40B4-BE49-F238E27FC236}">
+                <a16:creationId xmlns:a16="http://schemas.microsoft.com/office/drawing/2014/main" id="{EA330340-1A2E-294E-AE43-D9F578A26C97}"/>
+              </a:ext>
+            </a:extLst>
+          </p:cNvPr>
+          <p:cNvSpPr txBox="1"/>
+          <p:nvPr/>
+        </p:nvSpPr>
+        <p:spPr>
+          <a:xfrm>
+            <a:off x="4293350" y="2286953"/>
+            <a:ext cx="442750" cy="369332"/>
+          </a:xfrm>
+          <a:prstGeom prst="rect">
+            <a:avLst/>
+          </a:prstGeom>
+          <a:noFill/>
+        </p:spPr>
+        <p:txBody>
+          <a:bodyPr wrap="none" rtlCol="0">
+            <a:spAutoFit/>
+          </a:bodyPr>
+          <a:lstStyle/>
+          <a:p>
+            <a:r>
+              <a:rPr lang="en-US" dirty="0"/>
+              <a:t>(1)</a:t>
+            </a:r>
+          </a:p>
+        </p:txBody>
+      </p:sp>
+      <p:sp>
+        <p:nvSpPr>
+          <p:cNvPr id="79" name="TextBox 78">
+            <a:extLst>
+              <a:ext uri="{FF2B5EF4-FFF2-40B4-BE49-F238E27FC236}">
+                <a16:creationId xmlns:a16="http://schemas.microsoft.com/office/drawing/2014/main" id="{7891DC31-C3C7-D144-9A47-B432B617CB19}"/>
+              </a:ext>
+            </a:extLst>
+          </p:cNvPr>
+          <p:cNvSpPr txBox="1"/>
+          <p:nvPr/>
+        </p:nvSpPr>
+        <p:spPr>
+          <a:xfrm>
+            <a:off x="4293350" y="4462886"/>
+            <a:ext cx="442750" cy="369332"/>
+          </a:xfrm>
+          <a:prstGeom prst="rect">
+            <a:avLst/>
+          </a:prstGeom>
+          <a:noFill/>
+        </p:spPr>
+        <p:txBody>
+          <a:bodyPr wrap="none" rtlCol="0">
+            <a:spAutoFit/>
+          </a:bodyPr>
+          <a:lstStyle/>
+          <a:p>
+            <a:r>
+              <a:rPr lang="en-US" dirty="0"/>
+              <a:t>(1)</a:t>
+            </a:r>
+          </a:p>
+        </p:txBody>
+      </p:sp>
+      <p:sp>
+        <p:nvSpPr>
+          <p:cNvPr id="80" name="TextBox 79">
+            <a:extLst>
+              <a:ext uri="{FF2B5EF4-FFF2-40B4-BE49-F238E27FC236}">
+                <a16:creationId xmlns:a16="http://schemas.microsoft.com/office/drawing/2014/main" id="{63960CBA-2DB0-794D-874C-9EB543DB85F8}"/>
+              </a:ext>
+            </a:extLst>
+          </p:cNvPr>
+          <p:cNvSpPr txBox="1"/>
+          <p:nvPr/>
+        </p:nvSpPr>
+        <p:spPr>
+          <a:xfrm>
+            <a:off x="3175750" y="2981220"/>
+            <a:ext cx="442750" cy="369332"/>
+          </a:xfrm>
+          <a:prstGeom prst="rect">
+            <a:avLst/>
+          </a:prstGeom>
+          <a:noFill/>
+        </p:spPr>
+        <p:txBody>
+          <a:bodyPr wrap="none" rtlCol="0">
+            <a:spAutoFit/>
+          </a:bodyPr>
+          <a:lstStyle/>
+          <a:p>
+            <a:r>
+              <a:rPr lang="en-US" dirty="0"/>
+              <a:t>(2)</a:t>
+            </a:r>
+          </a:p>
+        </p:txBody>
+      </p:sp>
+      <p:sp>
+        <p:nvSpPr>
+          <p:cNvPr id="81" name="TextBox 80">
+            <a:extLst>
+              <a:ext uri="{FF2B5EF4-FFF2-40B4-BE49-F238E27FC236}">
+                <a16:creationId xmlns:a16="http://schemas.microsoft.com/office/drawing/2014/main" id="{D5518840-0F6E-8240-BBAF-58B1E470A6FB}"/>
+              </a:ext>
+            </a:extLst>
+          </p:cNvPr>
+          <p:cNvSpPr txBox="1"/>
+          <p:nvPr/>
+        </p:nvSpPr>
+        <p:spPr>
+          <a:xfrm>
+            <a:off x="4598150" y="2981220"/>
+            <a:ext cx="442750" cy="369332"/>
+          </a:xfrm>
+          <a:prstGeom prst="rect">
+            <a:avLst/>
+          </a:prstGeom>
+          <a:noFill/>
+        </p:spPr>
+        <p:txBody>
+          <a:bodyPr wrap="none" rtlCol="0">
+            <a:spAutoFit/>
+          </a:bodyPr>
+          <a:lstStyle/>
+          <a:p>
+            <a:r>
+              <a:rPr lang="en-US" dirty="0"/>
+              <a:t>(2)</a:t>
+            </a:r>
+          </a:p>
+        </p:txBody>
+      </p:sp>
+      <p:sp>
+        <p:nvSpPr>
+          <p:cNvPr id="82" name="TextBox 81">
+            <a:extLst>
+              <a:ext uri="{FF2B5EF4-FFF2-40B4-BE49-F238E27FC236}">
+                <a16:creationId xmlns:a16="http://schemas.microsoft.com/office/drawing/2014/main" id="{6CB42EE5-257F-9D4F-89DF-E58ECD087D8C}"/>
+              </a:ext>
+            </a:extLst>
+          </p:cNvPr>
+          <p:cNvSpPr txBox="1"/>
+          <p:nvPr/>
+        </p:nvSpPr>
+        <p:spPr>
+          <a:xfrm>
+            <a:off x="4598150" y="1880553"/>
+            <a:ext cx="442750" cy="369332"/>
+          </a:xfrm>
+          <a:prstGeom prst="rect">
+            <a:avLst/>
+          </a:prstGeom>
+          <a:noFill/>
+        </p:spPr>
+        <p:txBody>
+          <a:bodyPr wrap="none" rtlCol="0">
+            <a:spAutoFit/>
+          </a:bodyPr>
+          <a:lstStyle/>
+          <a:p>
+            <a:r>
+              <a:rPr lang="en-US" dirty="0"/>
+              <a:t>(2)</a:t>
+            </a:r>
+          </a:p>
+        </p:txBody>
+      </p:sp>
+      <p:sp>
+        <p:nvSpPr>
+          <p:cNvPr id="83" name="TextBox 82">
+            <a:extLst>
+              <a:ext uri="{FF2B5EF4-FFF2-40B4-BE49-F238E27FC236}">
+                <a16:creationId xmlns:a16="http://schemas.microsoft.com/office/drawing/2014/main" id="{6AC6502D-D7FC-2448-A7B9-6A282B4E3311}"/>
+              </a:ext>
+            </a:extLst>
+          </p:cNvPr>
+          <p:cNvSpPr txBox="1"/>
+          <p:nvPr/>
+        </p:nvSpPr>
+        <p:spPr>
+          <a:xfrm>
+            <a:off x="5385550" y="1880553"/>
+            <a:ext cx="442750" cy="369332"/>
+          </a:xfrm>
+          <a:prstGeom prst="rect">
+            <a:avLst/>
+          </a:prstGeom>
+          <a:noFill/>
+        </p:spPr>
+        <p:txBody>
+          <a:bodyPr wrap="none" rtlCol="0">
+            <a:spAutoFit/>
+          </a:bodyPr>
+          <a:lstStyle/>
+          <a:p>
+            <a:r>
+              <a:rPr lang="en-US" dirty="0"/>
+              <a:t>(3)</a:t>
+            </a:r>
+          </a:p>
+        </p:txBody>
+      </p:sp>
+      <p:sp>
+        <p:nvSpPr>
+          <p:cNvPr id="84" name="TextBox 83">
+            <a:extLst>
+              <a:ext uri="{FF2B5EF4-FFF2-40B4-BE49-F238E27FC236}">
+                <a16:creationId xmlns:a16="http://schemas.microsoft.com/office/drawing/2014/main" id="{CA7387D6-3396-F948-A988-4FB658225919}"/>
+              </a:ext>
+            </a:extLst>
+          </p:cNvPr>
+          <p:cNvSpPr txBox="1"/>
+          <p:nvPr/>
+        </p:nvSpPr>
+        <p:spPr>
+          <a:xfrm>
+            <a:off x="5385550" y="2972753"/>
+            <a:ext cx="442750" cy="369332"/>
+          </a:xfrm>
+          <a:prstGeom prst="rect">
+            <a:avLst/>
+          </a:prstGeom>
+          <a:noFill/>
+        </p:spPr>
+        <p:txBody>
+          <a:bodyPr wrap="none" rtlCol="0">
+            <a:spAutoFit/>
+          </a:bodyPr>
+          <a:lstStyle/>
+          <a:p>
+            <a:r>
+              <a:rPr lang="en-US" dirty="0"/>
+              <a:t>(3)</a:t>
+            </a:r>
+          </a:p>
+        </p:txBody>
+      </p:sp>
+      <p:sp>
+        <p:nvSpPr>
+          <p:cNvPr id="85" name="TextBox 84">
+            <a:extLst>
+              <a:ext uri="{FF2B5EF4-FFF2-40B4-BE49-F238E27FC236}">
+                <a16:creationId xmlns:a16="http://schemas.microsoft.com/office/drawing/2014/main" id="{CEC97CB5-A7D2-CC4A-BEF6-18B153FB4C40}"/>
+              </a:ext>
+            </a:extLst>
+          </p:cNvPr>
+          <p:cNvSpPr txBox="1"/>
+          <p:nvPr/>
+        </p:nvSpPr>
+        <p:spPr>
+          <a:xfrm>
+            <a:off x="3954684" y="2972753"/>
+            <a:ext cx="442750" cy="369332"/>
+          </a:xfrm>
+          <a:prstGeom prst="rect">
+            <a:avLst/>
+          </a:prstGeom>
+          <a:noFill/>
+        </p:spPr>
+        <p:txBody>
+          <a:bodyPr wrap="none" rtlCol="0">
+            <a:spAutoFit/>
+          </a:bodyPr>
+          <a:lstStyle/>
+          <a:p>
+            <a:r>
+              <a:rPr lang="en-US" dirty="0"/>
+              <a:t>(3)</a:t>
+            </a:r>
+          </a:p>
+        </p:txBody>
+      </p:sp>
+      <p:sp>
+        <p:nvSpPr>
+          <p:cNvPr id="86" name="TextBox 85">
+            <a:extLst>
+              <a:ext uri="{FF2B5EF4-FFF2-40B4-BE49-F238E27FC236}">
+                <a16:creationId xmlns:a16="http://schemas.microsoft.com/office/drawing/2014/main" id="{ED5B5866-DE51-9C4B-8E6C-8788B113C13A}"/>
+              </a:ext>
+            </a:extLst>
+          </p:cNvPr>
+          <p:cNvSpPr txBox="1"/>
+          <p:nvPr/>
+        </p:nvSpPr>
+        <p:spPr>
+          <a:xfrm>
+            <a:off x="3954684" y="4056486"/>
+            <a:ext cx="442750" cy="369332"/>
+          </a:xfrm>
+          <a:prstGeom prst="rect">
+            <a:avLst/>
+          </a:prstGeom>
+          <a:noFill/>
+        </p:spPr>
+        <p:txBody>
+          <a:bodyPr wrap="none" rtlCol="0">
+            <a:spAutoFit/>
+          </a:bodyPr>
+          <a:lstStyle/>
+          <a:p>
+            <a:r>
+              <a:rPr lang="en-US" dirty="0"/>
+              <a:t>(5)</a:t>
+            </a:r>
+          </a:p>
+        </p:txBody>
+      </p:sp>
+      <p:sp>
+        <p:nvSpPr>
+          <p:cNvPr id="87" name="TextBox 86">
+            <a:extLst>
+              <a:ext uri="{FF2B5EF4-FFF2-40B4-BE49-F238E27FC236}">
+                <a16:creationId xmlns:a16="http://schemas.microsoft.com/office/drawing/2014/main" id="{FF69E044-6DD0-6B44-B2E7-E50915D4E754}"/>
+              </a:ext>
+            </a:extLst>
+          </p:cNvPr>
+          <p:cNvSpPr txBox="1"/>
+          <p:nvPr/>
+        </p:nvSpPr>
+        <p:spPr>
+          <a:xfrm>
+            <a:off x="5385550" y="4056486"/>
+            <a:ext cx="442750" cy="369332"/>
+          </a:xfrm>
+          <a:prstGeom prst="rect">
+            <a:avLst/>
+          </a:prstGeom>
+          <a:noFill/>
+        </p:spPr>
+        <p:txBody>
+          <a:bodyPr wrap="none" rtlCol="0">
+            <a:spAutoFit/>
+          </a:bodyPr>
+          <a:lstStyle/>
+          <a:p>
+            <a:r>
+              <a:rPr lang="en-US" dirty="0"/>
+              <a:t>(5)</a:t>
+            </a:r>
+          </a:p>
+        </p:txBody>
+      </p:sp>
+      <p:sp>
+        <p:nvSpPr>
+          <p:cNvPr id="88" name="TextBox 87">
+            <a:extLst>
+              <a:ext uri="{FF2B5EF4-FFF2-40B4-BE49-F238E27FC236}">
+                <a16:creationId xmlns:a16="http://schemas.microsoft.com/office/drawing/2014/main" id="{F61A184E-5E3F-BA42-8060-1A1F51CE3265}"/>
+              </a:ext>
+            </a:extLst>
+          </p:cNvPr>
+          <p:cNvSpPr txBox="1"/>
+          <p:nvPr/>
+        </p:nvSpPr>
+        <p:spPr>
+          <a:xfrm>
+            <a:off x="4615084" y="4056486"/>
+            <a:ext cx="442750" cy="369332"/>
+          </a:xfrm>
+          <a:prstGeom prst="rect">
+            <a:avLst/>
+          </a:prstGeom>
+          <a:noFill/>
+        </p:spPr>
+        <p:txBody>
+          <a:bodyPr wrap="none" rtlCol="0">
+            <a:spAutoFit/>
+          </a:bodyPr>
+          <a:lstStyle/>
+          <a:p>
+            <a:r>
+              <a:rPr lang="en-US" dirty="0"/>
+              <a:t>(4)</a:t>
+            </a:r>
+          </a:p>
+        </p:txBody>
+      </p:sp>
+      <p:sp>
+        <p:nvSpPr>
+          <p:cNvPr id="89" name="TextBox 88">
+            <a:extLst>
+              <a:ext uri="{FF2B5EF4-FFF2-40B4-BE49-F238E27FC236}">
+                <a16:creationId xmlns:a16="http://schemas.microsoft.com/office/drawing/2014/main" id="{52D6EC99-FC4C-9140-A18F-36D95D1CE5AF}"/>
+              </a:ext>
+            </a:extLst>
+          </p:cNvPr>
+          <p:cNvSpPr txBox="1"/>
+          <p:nvPr/>
+        </p:nvSpPr>
+        <p:spPr>
+          <a:xfrm>
+            <a:off x="3184217" y="4056486"/>
+            <a:ext cx="442750" cy="369332"/>
+          </a:xfrm>
+          <a:prstGeom prst="rect">
+            <a:avLst/>
+          </a:prstGeom>
+          <a:noFill/>
+        </p:spPr>
+        <p:txBody>
+          <a:bodyPr wrap="none" rtlCol="0">
+            <a:spAutoFit/>
+          </a:bodyPr>
+          <a:lstStyle/>
+          <a:p>
+            <a:r>
+              <a:rPr lang="en-US" dirty="0"/>
+              <a:t>(4)</a:t>
+            </a:r>
+          </a:p>
+        </p:txBody>
+      </p:sp>
+      <p:grpSp>
+        <p:nvGrpSpPr>
+          <p:cNvPr id="93" name="Group 92">
+            <a:extLst>
+              <a:ext uri="{FF2B5EF4-FFF2-40B4-BE49-F238E27FC236}">
+                <a16:creationId xmlns:a16="http://schemas.microsoft.com/office/drawing/2014/main" id="{886E1A1E-3ACD-874B-BE68-A250738CB0A0}"/>
+              </a:ext>
+            </a:extLst>
+          </p:cNvPr>
+          <p:cNvGrpSpPr/>
+          <p:nvPr/>
+        </p:nvGrpSpPr>
+        <p:grpSpPr>
+          <a:xfrm flipV="1">
+            <a:off x="3201151" y="3835287"/>
+            <a:ext cx="1153165" cy="853674"/>
+            <a:chOff x="6515069" y="931263"/>
+            <a:chExt cx="3091630" cy="2309579"/>
+          </a:xfrm>
+        </p:grpSpPr>
+        <p:sp>
+          <p:nvSpPr>
+            <p:cNvPr id="94" name="Arc 93">
+              <a:extLst>
+                <a:ext uri="{FF2B5EF4-FFF2-40B4-BE49-F238E27FC236}">
+                  <a16:creationId xmlns:a16="http://schemas.microsoft.com/office/drawing/2014/main" id="{FBF8849C-4E24-7C49-A364-2C8C2B3C6A54}"/>
+                </a:ext>
+              </a:extLst>
+            </p:cNvPr>
+            <p:cNvSpPr/>
+            <p:nvPr/>
+          </p:nvSpPr>
+          <p:spPr>
+            <a:xfrm rot="13687481">
+              <a:off x="7445610" y="1079753"/>
+              <a:ext cx="2222950" cy="2099228"/>
+            </a:xfrm>
+            <a:prstGeom prst="arc">
+              <a:avLst/>
+            </a:prstGeom>
+            <a:ln>
+              <a:tailEnd type="triangle"/>
+            </a:ln>
+          </p:spPr>
+          <p:style>
+            <a:lnRef idx="1">
+              <a:schemeClr val="accent1"/>
+            </a:lnRef>
+            <a:fillRef idx="0">
+              <a:schemeClr val="accent1"/>
+            </a:fillRef>
+            <a:effectRef idx="0">
+              <a:schemeClr val="accent1"/>
+            </a:effectRef>
+            <a:fontRef idx="minor">
+              <a:schemeClr val="tx1"/>
+            </a:fontRef>
+          </p:style>
+          <p:txBody>
+            <a:bodyPr rtlCol="0" anchor="ctr"/>
+            <a:lstStyle/>
+            <a:p>
+              <a:pPr algn="ctr"/>
+              <a:endParaRPr lang="en-US" dirty="0"/>
+            </a:p>
+          </p:txBody>
+        </p:sp>
+        <p:sp>
+          <p:nvSpPr>
+            <p:cNvPr id="95" name="Arc 94">
+              <a:extLst>
+                <a:ext uri="{FF2B5EF4-FFF2-40B4-BE49-F238E27FC236}">
+                  <a16:creationId xmlns:a16="http://schemas.microsoft.com/office/drawing/2014/main" id="{FFC1049F-C46B-8547-AEE1-8AFEC57B92C6}"/>
+                </a:ext>
+              </a:extLst>
+            </p:cNvPr>
+            <p:cNvSpPr/>
+            <p:nvPr/>
+          </p:nvSpPr>
+          <p:spPr>
+            <a:xfrm rot="2700000">
+              <a:off x="6453208" y="993124"/>
+              <a:ext cx="2222950" cy="2099228"/>
+            </a:xfrm>
+            <a:prstGeom prst="arc">
+              <a:avLst/>
+            </a:prstGeom>
+            <a:ln>
+              <a:tailEnd type="triangle"/>
+            </a:ln>
+          </p:spPr>
+          <p:style>
+            <a:lnRef idx="1">
+              <a:schemeClr val="accent1"/>
+            </a:lnRef>
+            <a:fillRef idx="0">
+              <a:schemeClr val="accent1"/>
+            </a:fillRef>
+            <a:effectRef idx="0">
+              <a:schemeClr val="accent1"/>
+            </a:effectRef>
+            <a:fontRef idx="minor">
+              <a:schemeClr val="tx1"/>
+            </a:fontRef>
+          </p:style>
+          <p:txBody>
+            <a:bodyPr rtlCol="0" anchor="ctr"/>
+            <a:lstStyle/>
+            <a:p>
+              <a:pPr algn="ctr"/>
+              <a:endParaRPr lang="en-US" dirty="0"/>
+            </a:p>
+          </p:txBody>
+        </p:sp>
+      </p:grpSp>
+      <p:grpSp>
+        <p:nvGrpSpPr>
+          <p:cNvPr id="96" name="Group 95">
+            <a:extLst>
+              <a:ext uri="{FF2B5EF4-FFF2-40B4-BE49-F238E27FC236}">
+                <a16:creationId xmlns:a16="http://schemas.microsoft.com/office/drawing/2014/main" id="{52E6C563-876D-4D4C-A464-9ED73C09AF4D}"/>
+              </a:ext>
+            </a:extLst>
+          </p:cNvPr>
+          <p:cNvGrpSpPr/>
+          <p:nvPr/>
+        </p:nvGrpSpPr>
+        <p:grpSpPr>
+          <a:xfrm flipV="1">
+            <a:off x="4632017" y="3835287"/>
+            <a:ext cx="1153165" cy="853674"/>
+            <a:chOff x="6515069" y="931263"/>
+            <a:chExt cx="3091630" cy="2309579"/>
+          </a:xfrm>
+        </p:grpSpPr>
+        <p:sp>
+          <p:nvSpPr>
+            <p:cNvPr id="97" name="Arc 96">
+              <a:extLst>
+                <a:ext uri="{FF2B5EF4-FFF2-40B4-BE49-F238E27FC236}">
+                  <a16:creationId xmlns:a16="http://schemas.microsoft.com/office/drawing/2014/main" id="{D0AFA5EB-191D-7D49-B4BC-993A0DEF7047}"/>
+                </a:ext>
+              </a:extLst>
+            </p:cNvPr>
+            <p:cNvSpPr/>
+            <p:nvPr/>
+          </p:nvSpPr>
+          <p:spPr>
+            <a:xfrm rot="13687481">
+              <a:off x="7445610" y="1079753"/>
+              <a:ext cx="2222950" cy="2099228"/>
+            </a:xfrm>
+            <a:prstGeom prst="arc">
+              <a:avLst/>
+            </a:prstGeom>
+            <a:ln>
+              <a:tailEnd type="triangle"/>
+            </a:ln>
+          </p:spPr>
+          <p:style>
+            <a:lnRef idx="1">
+              <a:schemeClr val="accent1"/>
+            </a:lnRef>
+            <a:fillRef idx="0">
+              <a:schemeClr val="accent1"/>
+            </a:fillRef>
+            <a:effectRef idx="0">
+              <a:schemeClr val="accent1"/>
+            </a:effectRef>
+            <a:fontRef idx="minor">
+              <a:schemeClr val="tx1"/>
+            </a:fontRef>
+          </p:style>
+          <p:txBody>
+            <a:bodyPr rtlCol="0" anchor="ctr"/>
+            <a:lstStyle/>
+            <a:p>
+              <a:pPr algn="ctr"/>
+              <a:endParaRPr lang="en-US" dirty="0"/>
+            </a:p>
+          </p:txBody>
+        </p:sp>
+        <p:sp>
+          <p:nvSpPr>
+            <p:cNvPr id="98" name="Arc 97">
+              <a:extLst>
+                <a:ext uri="{FF2B5EF4-FFF2-40B4-BE49-F238E27FC236}">
+                  <a16:creationId xmlns:a16="http://schemas.microsoft.com/office/drawing/2014/main" id="{A4DFCAE0-5528-C542-84FA-6FCEE7205DCF}"/>
+                </a:ext>
+              </a:extLst>
+            </p:cNvPr>
+            <p:cNvSpPr/>
+            <p:nvPr/>
+          </p:nvSpPr>
+          <p:spPr>
+            <a:xfrm rot="2700000">
+              <a:off x="6453208" y="993124"/>
+              <a:ext cx="2222950" cy="2099228"/>
+            </a:xfrm>
+            <a:prstGeom prst="arc">
+              <a:avLst/>
+            </a:prstGeom>
+            <a:ln>
+              <a:tailEnd type="triangle"/>
+            </a:ln>
+          </p:spPr>
+          <p:style>
+            <a:lnRef idx="1">
+              <a:schemeClr val="accent1"/>
+            </a:lnRef>
+            <a:fillRef idx="0">
+              <a:schemeClr val="accent1"/>
+            </a:fillRef>
+            <a:effectRef idx="0">
+              <a:schemeClr val="accent1"/>
+            </a:effectRef>
+            <a:fontRef idx="minor">
+              <a:schemeClr val="tx1"/>
+            </a:fontRef>
+          </p:style>
+          <p:txBody>
+            <a:bodyPr rtlCol="0" anchor="ctr"/>
+            <a:lstStyle/>
+            <a:p>
+              <a:pPr algn="ctr"/>
+              <a:endParaRPr lang="en-US" dirty="0"/>
+            </a:p>
+          </p:txBody>
+        </p:sp>
+      </p:grpSp>
     </p:spTree>
     <p:extLst>
       <p:ext uri="{BB962C8B-B14F-4D97-AF65-F5344CB8AC3E}">
@@ -4704,8 +6020,8 @@
         </p:nvSpPr>
         <p:spPr>
           <a:xfrm>
-            <a:off x="9489977" y="4545623"/>
-            <a:ext cx="945485" cy="501266"/>
+            <a:off x="8647437" y="4545623"/>
+            <a:ext cx="729692" cy="501266"/>
           </a:xfrm>
           <a:prstGeom prst="ellipse">
             <a:avLst/>
@@ -4739,7 +6055,7 @@
                   <a:srgbClr val="FF0000"/>
                 </a:solidFill>
               </a:rPr>
-              <a:t>3 0 0</a:t>
+              <a:t>3 0</a:t>
             </a:r>
           </a:p>
         </p:txBody>
@@ -4761,8 +6077,8 @@
         </p:nvCxnSpPr>
         <p:spPr>
           <a:xfrm flipH="1">
-            <a:off x="9009688" y="4796256"/>
-            <a:ext cx="480289" cy="0"/>
+            <a:off x="7951356" y="4796256"/>
+            <a:ext cx="696081" cy="0"/>
           </a:xfrm>
           <a:prstGeom prst="straightConnector1">
             <a:avLst/>
@@ -4800,8 +6116,8 @@
         </p:nvSpPr>
         <p:spPr>
           <a:xfrm>
-            <a:off x="8064201" y="4545623"/>
-            <a:ext cx="945485" cy="501266"/>
+            <a:off x="7221661" y="4545623"/>
+            <a:ext cx="729692" cy="501266"/>
           </a:xfrm>
           <a:prstGeom prst="ellipse">
             <a:avLst/>
@@ -4835,7 +6151,7 @@
                   <a:srgbClr val="FF0000"/>
                 </a:solidFill>
               </a:rPr>
-              <a:t>2 1 0</a:t>
+              <a:t>2 0</a:t>
             </a:r>
           </a:p>
         </p:txBody>
@@ -4851,13 +6167,14 @@
           </p:cNvPr>
           <p:cNvCxnSpPr>
             <a:cxnSpLocks/>
+            <a:stCxn id="24" idx="2"/>
           </p:cNvCxnSpPr>
           <p:nvPr/>
         </p:nvCxnSpPr>
         <p:spPr>
           <a:xfrm flipH="1">
-            <a:off x="7575852" y="4796256"/>
-            <a:ext cx="480289" cy="0"/>
+            <a:off x="6517521" y="4796256"/>
+            <a:ext cx="704140" cy="0"/>
           </a:xfrm>
           <a:prstGeom prst="straightConnector1">
             <a:avLst/>
@@ -4895,8 +6212,8 @@
         </p:nvSpPr>
         <p:spPr>
           <a:xfrm>
-            <a:off x="6637737" y="4545623"/>
-            <a:ext cx="945485" cy="501266"/>
+            <a:off x="5795197" y="4561965"/>
+            <a:ext cx="729692" cy="501266"/>
           </a:xfrm>
           <a:prstGeom prst="ellipse">
             <a:avLst/>
@@ -4930,7 +6247,7 @@
                   <a:srgbClr val="FF0000"/>
                 </a:solidFill>
               </a:rPr>
-              <a:t>1 2 0</a:t>
+              <a:t>1 0</a:t>
             </a:r>
           </a:p>
         </p:txBody>
@@ -4949,8 +6266,8 @@
         </p:nvSpPr>
         <p:spPr>
           <a:xfrm>
-            <a:off x="8056141" y="3435899"/>
-            <a:ext cx="945485" cy="501266"/>
+            <a:off x="7213601" y="3435899"/>
+            <a:ext cx="729692" cy="501266"/>
           </a:xfrm>
           <a:prstGeom prst="ellipse">
             <a:avLst/>
@@ -4984,7 +6301,7 @@
                   <a:srgbClr val="FF0000"/>
                 </a:solidFill>
               </a:rPr>
-              <a:t>2 0 1</a:t>
+              <a:t>2 1</a:t>
             </a:r>
           </a:p>
         </p:txBody>
@@ -5003,8 +6320,8 @@
         </p:nvSpPr>
         <p:spPr>
           <a:xfrm>
-            <a:off x="6650674" y="3435899"/>
-            <a:ext cx="945485" cy="501266"/>
+            <a:off x="5808134" y="3435899"/>
+            <a:ext cx="729692" cy="501266"/>
           </a:xfrm>
           <a:prstGeom prst="ellipse">
             <a:avLst/>
@@ -5038,7 +6355,7 @@
                   <a:srgbClr val="FF0000"/>
                 </a:solidFill>
               </a:rPr>
-              <a:t>1 1 1</a:t>
+              <a:t>1 1</a:t>
             </a:r>
           </a:p>
         </p:txBody>
@@ -5061,7 +6378,7 @@
         </p:nvCxnSpPr>
         <p:spPr>
           <a:xfrm flipH="1" flipV="1">
-            <a:off x="8528884" y="3937165"/>
+            <a:off x="7578447" y="3937165"/>
             <a:ext cx="8060" cy="608458"/>
           </a:xfrm>
           <a:prstGeom prst="straightConnector1">
@@ -5097,13 +6414,15 @@
           </p:cNvPr>
           <p:cNvCxnSpPr>
             <a:cxnSpLocks/>
+            <a:stCxn id="26" idx="0"/>
+            <a:endCxn id="30" idx="4"/>
           </p:cNvCxnSpPr>
           <p:nvPr/>
         </p:nvCxnSpPr>
         <p:spPr>
-          <a:xfrm flipH="1" flipV="1">
-            <a:off x="7114950" y="3937165"/>
-            <a:ext cx="8060" cy="608458"/>
+          <a:xfrm flipV="1">
+            <a:off x="6160043" y="3937165"/>
+            <a:ext cx="12937" cy="624800"/>
           </a:xfrm>
           <a:prstGeom prst="straightConnector1">
             <a:avLst/>
@@ -5141,8 +6460,8 @@
         </p:nvSpPr>
         <p:spPr>
           <a:xfrm>
-            <a:off x="6650674" y="2309832"/>
-            <a:ext cx="945485" cy="501266"/>
+            <a:off x="5808134" y="2309832"/>
+            <a:ext cx="729692" cy="501266"/>
           </a:xfrm>
           <a:prstGeom prst="ellipse">
             <a:avLst/>
@@ -5176,7 +6495,7 @@
                   <a:srgbClr val="FF0000"/>
                 </a:solidFill>
               </a:rPr>
-              <a:t>1 0 2</a:t>
+              <a:t>1 2</a:t>
             </a:r>
           </a:p>
         </p:txBody>
@@ -5192,13 +6511,15 @@
           </p:cNvPr>
           <p:cNvCxnSpPr>
             <a:cxnSpLocks/>
+            <a:stCxn id="30" idx="0"/>
+            <a:endCxn id="35" idx="4"/>
           </p:cNvCxnSpPr>
           <p:nvPr/>
         </p:nvCxnSpPr>
         <p:spPr>
-          <a:xfrm flipH="1" flipV="1">
-            <a:off x="7114950" y="2811098"/>
-            <a:ext cx="8060" cy="608458"/>
+          <a:xfrm flipV="1">
+            <a:off x="6172980" y="2811098"/>
+            <a:ext cx="0" cy="624801"/>
           </a:xfrm>
           <a:prstGeom prst="straightConnector1">
             <a:avLst/>
@@ -5233,13 +6554,14 @@
           </p:cNvPr>
           <p:cNvCxnSpPr>
             <a:cxnSpLocks/>
+            <a:stCxn id="28" idx="2"/>
           </p:cNvCxnSpPr>
           <p:nvPr/>
         </p:nvCxnSpPr>
         <p:spPr>
           <a:xfrm flipH="1">
-            <a:off x="7575852" y="3687122"/>
-            <a:ext cx="480289" cy="0"/>
+            <a:off x="6517521" y="3686532"/>
+            <a:ext cx="696080" cy="590"/>
           </a:xfrm>
           <a:prstGeom prst="straightConnector1">
             <a:avLst/>
@@ -5274,13 +6596,14 @@
           </p:cNvPr>
           <p:cNvCxnSpPr>
             <a:cxnSpLocks/>
+            <a:endCxn id="41" idx="6"/>
           </p:cNvCxnSpPr>
           <p:nvPr/>
         </p:nvCxnSpPr>
         <p:spPr>
           <a:xfrm flipH="1">
-            <a:off x="6156421" y="3670188"/>
-            <a:ext cx="480289" cy="0"/>
+            <a:off x="5119422" y="3686532"/>
+            <a:ext cx="710048" cy="9057"/>
           </a:xfrm>
           <a:prstGeom prst="straightConnector1">
             <a:avLst/>
@@ -5318,8 +6641,8 @@
         </p:nvSpPr>
         <p:spPr>
           <a:xfrm>
-            <a:off x="5210934" y="3444956"/>
-            <a:ext cx="945485" cy="501266"/>
+            <a:off x="4389730" y="3444956"/>
+            <a:ext cx="729692" cy="501266"/>
           </a:xfrm>
           <a:prstGeom prst="ellipse">
             <a:avLst/>
@@ -5353,7 +6676,7 @@
                   <a:srgbClr val="FF0000"/>
                 </a:solidFill>
               </a:rPr>
-              <a:t>0 2 1</a:t>
+              <a:t>0 1</a:t>
             </a:r>
           </a:p>
         </p:txBody>
@@ -5372,8 +6695,8 @@
         </p:nvSpPr>
         <p:spPr>
           <a:xfrm>
-            <a:off x="5228274" y="2309832"/>
-            <a:ext cx="945485" cy="501266"/>
+            <a:off x="4385734" y="2309832"/>
+            <a:ext cx="729692" cy="501266"/>
           </a:xfrm>
           <a:prstGeom prst="ellipse">
             <a:avLst/>
@@ -5407,7 +6730,7 @@
                   <a:srgbClr val="FF0000"/>
                 </a:solidFill>
               </a:rPr>
-              <a:t>0 1 2</a:t>
+              <a:t>0 2</a:t>
             </a:r>
           </a:p>
         </p:txBody>
@@ -5423,13 +6746,15 @@
           </p:cNvPr>
           <p:cNvCxnSpPr>
             <a:cxnSpLocks/>
+            <a:stCxn id="41" idx="0"/>
+            <a:endCxn id="42" idx="4"/>
           </p:cNvCxnSpPr>
           <p:nvPr/>
         </p:nvCxnSpPr>
         <p:spPr>
           <a:xfrm flipH="1" flipV="1">
-            <a:off x="5692550" y="2811098"/>
-            <a:ext cx="8060" cy="608458"/>
+            <a:off x="4750580" y="2811098"/>
+            <a:ext cx="3996" cy="633858"/>
           </a:xfrm>
           <a:prstGeom prst="straightConnector1">
             <a:avLst/>
@@ -5464,13 +6789,15 @@
           </p:cNvPr>
           <p:cNvCxnSpPr>
             <a:cxnSpLocks/>
+            <a:stCxn id="35" idx="2"/>
+            <a:endCxn id="42" idx="6"/>
           </p:cNvCxnSpPr>
           <p:nvPr/>
         </p:nvCxnSpPr>
         <p:spPr>
           <a:xfrm flipH="1">
-            <a:off x="6156421" y="2552588"/>
-            <a:ext cx="480289" cy="0"/>
+            <a:off x="5115426" y="2560465"/>
+            <a:ext cx="692708" cy="0"/>
           </a:xfrm>
           <a:prstGeom prst="straightConnector1">
             <a:avLst/>
@@ -5508,8 +6835,8 @@
         </p:nvSpPr>
         <p:spPr>
           <a:xfrm>
-            <a:off x="5228274" y="1175299"/>
-            <a:ext cx="945485" cy="501266"/>
+            <a:off x="4385734" y="1175299"/>
+            <a:ext cx="729692" cy="501266"/>
           </a:xfrm>
           <a:prstGeom prst="ellipse">
             <a:avLst/>
@@ -5543,7 +6870,7 @@
                   <a:srgbClr val="FF0000"/>
                 </a:solidFill>
               </a:rPr>
-              <a:t>0 0 3</a:t>
+              <a:t>0 3</a:t>
             </a:r>
           </a:p>
         </p:txBody>
@@ -5559,13 +6886,15 @@
           </p:cNvPr>
           <p:cNvCxnSpPr>
             <a:cxnSpLocks/>
+            <a:stCxn id="42" idx="0"/>
+            <a:endCxn id="46" idx="4"/>
           </p:cNvCxnSpPr>
           <p:nvPr/>
         </p:nvCxnSpPr>
         <p:spPr>
-          <a:xfrm flipH="1" flipV="1">
-            <a:off x="5692550" y="1676565"/>
-            <a:ext cx="8060" cy="608458"/>
+          <a:xfrm flipV="1">
+            <a:off x="4750580" y="1676565"/>
+            <a:ext cx="0" cy="633267"/>
           </a:xfrm>
           <a:prstGeom prst="straightConnector1">
             <a:avLst/>
@@ -5589,6 +6918,158 @@
           </a:fontRef>
         </p:style>
       </p:cxnSp>
+      <p:cxnSp>
+        <p:nvCxnSpPr>
+          <p:cNvPr id="67" name="Straight Arrow Connector 66">
+            <a:extLst>
+              <a:ext uri="{FF2B5EF4-FFF2-40B4-BE49-F238E27FC236}">
+                <a16:creationId xmlns:a16="http://schemas.microsoft.com/office/drawing/2014/main" id="{F8D90000-FAAD-E244-B17F-0B44AFA11F57}"/>
+              </a:ext>
+            </a:extLst>
+          </p:cNvPr>
+          <p:cNvCxnSpPr>
+            <a:cxnSpLocks/>
+          </p:cNvCxnSpPr>
+          <p:nvPr/>
+        </p:nvCxnSpPr>
+        <p:spPr>
+          <a:xfrm flipH="1">
+            <a:off x="7087756" y="1600746"/>
+            <a:ext cx="696081" cy="0"/>
+          </a:xfrm>
+          <a:prstGeom prst="straightConnector1">
+            <a:avLst/>
+          </a:prstGeom>
+          <a:ln>
+            <a:tailEnd type="triangle"/>
+          </a:ln>
+        </p:spPr>
+        <p:style>
+          <a:lnRef idx="1">
+            <a:schemeClr val="accent1"/>
+          </a:lnRef>
+          <a:fillRef idx="0">
+            <a:schemeClr val="accent1"/>
+          </a:fillRef>
+          <a:effectRef idx="0">
+            <a:schemeClr val="accent1"/>
+          </a:effectRef>
+          <a:fontRef idx="minor">
+            <a:schemeClr val="tx1"/>
+          </a:fontRef>
+        </p:style>
+      </p:cxnSp>
+      <p:cxnSp>
+        <p:nvCxnSpPr>
+          <p:cNvPr id="68" name="Straight Arrow Connector 67">
+            <a:extLst>
+              <a:ext uri="{FF2B5EF4-FFF2-40B4-BE49-F238E27FC236}">
+                <a16:creationId xmlns:a16="http://schemas.microsoft.com/office/drawing/2014/main" id="{6118C5A4-78C6-E04B-8B4F-98A182D0D739}"/>
+              </a:ext>
+            </a:extLst>
+          </p:cNvPr>
+          <p:cNvCxnSpPr>
+            <a:cxnSpLocks/>
+          </p:cNvCxnSpPr>
+          <p:nvPr/>
+        </p:nvCxnSpPr>
+        <p:spPr>
+          <a:xfrm flipH="1" flipV="1">
+            <a:off x="7783837" y="1778165"/>
+            <a:ext cx="8060" cy="608458"/>
+          </a:xfrm>
+          <a:prstGeom prst="straightConnector1">
+            <a:avLst/>
+          </a:prstGeom>
+          <a:ln>
+            <a:tailEnd type="triangle"/>
+          </a:ln>
+        </p:spPr>
+        <p:style>
+          <a:lnRef idx="1">
+            <a:schemeClr val="accent1"/>
+          </a:lnRef>
+          <a:fillRef idx="0">
+            <a:schemeClr val="accent1"/>
+          </a:fillRef>
+          <a:effectRef idx="0">
+            <a:schemeClr val="accent1"/>
+          </a:effectRef>
+          <a:fontRef idx="minor">
+            <a:schemeClr val="tx1"/>
+          </a:fontRef>
+        </p:style>
+      </p:cxnSp>
+      <p:sp>
+        <p:nvSpPr>
+          <p:cNvPr id="69" name="TextBox 68">
+            <a:extLst>
+              <a:ext uri="{FF2B5EF4-FFF2-40B4-BE49-F238E27FC236}">
+                <a16:creationId xmlns:a16="http://schemas.microsoft.com/office/drawing/2014/main" id="{EDFFA5CE-3005-F345-A1A8-F1F9D941B028}"/>
+              </a:ext>
+            </a:extLst>
+          </p:cNvPr>
+          <p:cNvSpPr txBox="1"/>
+          <p:nvPr/>
+        </p:nvSpPr>
+        <p:spPr>
+          <a:xfrm>
+            <a:off x="7943293" y="1401886"/>
+            <a:ext cx="961610" cy="369332"/>
+          </a:xfrm>
+          <a:prstGeom prst="rect">
+            <a:avLst/>
+          </a:prstGeom>
+          <a:noFill/>
+        </p:spPr>
+        <p:txBody>
+          <a:bodyPr wrap="none" rtlCol="0">
+            <a:spAutoFit/>
+          </a:bodyPr>
+          <a:lstStyle/>
+          <a:p>
+            <a:r>
+              <a:rPr lang="en-US" dirty="0"/>
+              <a:t>produce</a:t>
+            </a:r>
+          </a:p>
+        </p:txBody>
+      </p:sp>
+      <p:sp>
+        <p:nvSpPr>
+          <p:cNvPr id="70" name="TextBox 69">
+            <a:extLst>
+              <a:ext uri="{FF2B5EF4-FFF2-40B4-BE49-F238E27FC236}">
+                <a16:creationId xmlns:a16="http://schemas.microsoft.com/office/drawing/2014/main" id="{7A379E62-C4FD-8F4F-A571-565DAEF9F0BC}"/>
+              </a:ext>
+            </a:extLst>
+          </p:cNvPr>
+          <p:cNvSpPr txBox="1"/>
+          <p:nvPr/>
+        </p:nvSpPr>
+        <p:spPr>
+          <a:xfrm>
+            <a:off x="7943293" y="1896534"/>
+            <a:ext cx="1035540" cy="369332"/>
+          </a:xfrm>
+          <a:prstGeom prst="rect">
+            <a:avLst/>
+          </a:prstGeom>
+          <a:noFill/>
+        </p:spPr>
+        <p:txBody>
+          <a:bodyPr wrap="none" rtlCol="0">
+            <a:spAutoFit/>
+          </a:bodyPr>
+          <a:lstStyle/>
+          <a:p>
+            <a:r>
+              <a:rPr lang="en-US" dirty="0"/>
+              <a:t>consume</a:t>
+            </a:r>
+          </a:p>
+        </p:txBody>
+      </p:sp>
     </p:spTree>
     <p:extLst>
       <p:ext uri="{BB962C8B-B14F-4D97-AF65-F5344CB8AC3E}">

</xml_diff>

<commit_message>
Made figures more clear
</commit_message>
<xml_diff>
--- a/book/figures.pptx
+++ b/book/figures.pptx
@@ -8866,13 +8866,14 @@
           </p:cNvPr>
           <p:cNvCxnSpPr>
             <a:cxnSpLocks/>
+            <a:endCxn id="90" idx="5"/>
           </p:cNvCxnSpPr>
           <p:nvPr/>
         </p:nvCxnSpPr>
         <p:spPr>
           <a:xfrm flipH="1" flipV="1">
-            <a:off x="5065735" y="2439230"/>
-            <a:ext cx="945302" cy="626773"/>
+            <a:off x="5052795" y="2389094"/>
+            <a:ext cx="958242" cy="676910"/>
           </a:xfrm>
           <a:prstGeom prst="straightConnector1">
             <a:avLst/>

</xml_diff>